<commit_message>
#11 #10 Update docs
</commit_message>
<xml_diff>
--- a/Documentation/Presentation.pptx
+++ b/Documentation/Presentation.pptx
@@ -4135,12 +4135,20 @@
               <a:t>Реализованы </a:t>
             </a:r>
             <a:r>
-              <a:rPr lang="ru-RU" dirty="0" err="1" smtClean="0"/>
-              <a:t>операцииобмена</a:t>
-            </a:r>
-            <a:r>
               <a:rPr lang="ru-RU" dirty="0" smtClean="0"/>
-              <a:t> сообщениями типа «точка-точка».</a:t>
+              <a:t>операции</a:t>
+            </a:r>
+            <a:r>
+              <a:rPr lang="en-US" smtClean="0"/>
+              <a:t> </a:t>
+            </a:r>
+            <a:r>
+              <a:rPr lang="ru-RU" smtClean="0"/>
+              <a:t>обмена </a:t>
+            </a:r>
+            <a:r>
+              <a:rPr lang="ru-RU" dirty="0" smtClean="0"/>
+              <a:t>сообщениями типа «точка-точка».</a:t>
             </a:r>
             <a:endParaRPr lang="ru-RU" dirty="0"/>
           </a:p>

</xml_diff>